<commit_message>
Section 4 - new API and semantics for local transactions
</commit_message>
<xml_diff>
--- a/LTX-RT.pptx
+++ b/LTX-RT.pptx
@@ -288,7 +288,7 @@
           <a:p>
             <a:fld id="{8314A642-4F67-384F-8484-C8FD7A44C755}" type="datetimeFigureOut">
               <a:rPr lang="en-US" smtClean="0"/>
-              <a:t>9/6/16</a:t>
+              <a:t>9/20/16</a:t>
             </a:fld>
             <a:endParaRPr lang="en-US"/>
           </a:p>
@@ -458,7 +458,7 @@
           <a:p>
             <a:fld id="{8314A642-4F67-384F-8484-C8FD7A44C755}" type="datetimeFigureOut">
               <a:rPr lang="en-US" smtClean="0"/>
-              <a:t>9/6/16</a:t>
+              <a:t>9/20/16</a:t>
             </a:fld>
             <a:endParaRPr lang="en-US"/>
           </a:p>
@@ -638,7 +638,7 @@
           <a:p>
             <a:fld id="{8314A642-4F67-384F-8484-C8FD7A44C755}" type="datetimeFigureOut">
               <a:rPr lang="en-US" smtClean="0"/>
-              <a:t>9/6/16</a:t>
+              <a:t>9/20/16</a:t>
             </a:fld>
             <a:endParaRPr lang="en-US"/>
           </a:p>
@@ -808,7 +808,7 @@
           <a:p>
             <a:fld id="{8314A642-4F67-384F-8484-C8FD7A44C755}" type="datetimeFigureOut">
               <a:rPr lang="en-US" smtClean="0"/>
-              <a:t>9/6/16</a:t>
+              <a:t>9/20/16</a:t>
             </a:fld>
             <a:endParaRPr lang="en-US"/>
           </a:p>
@@ -1054,7 +1054,7 @@
           <a:p>
             <a:fld id="{8314A642-4F67-384F-8484-C8FD7A44C755}" type="datetimeFigureOut">
               <a:rPr lang="en-US" smtClean="0"/>
-              <a:t>9/6/16</a:t>
+              <a:t>9/20/16</a:t>
             </a:fld>
             <a:endParaRPr lang="en-US"/>
           </a:p>
@@ -1342,7 +1342,7 @@
           <a:p>
             <a:fld id="{8314A642-4F67-384F-8484-C8FD7A44C755}" type="datetimeFigureOut">
               <a:rPr lang="en-US" smtClean="0"/>
-              <a:t>9/6/16</a:t>
+              <a:t>9/20/16</a:t>
             </a:fld>
             <a:endParaRPr lang="en-US"/>
           </a:p>
@@ -1764,7 +1764,7 @@
           <a:p>
             <a:fld id="{8314A642-4F67-384F-8484-C8FD7A44C755}" type="datetimeFigureOut">
               <a:rPr lang="en-US" smtClean="0"/>
-              <a:t>9/6/16</a:t>
+              <a:t>9/20/16</a:t>
             </a:fld>
             <a:endParaRPr lang="en-US"/>
           </a:p>
@@ -1882,7 +1882,7 @@
           <a:p>
             <a:fld id="{8314A642-4F67-384F-8484-C8FD7A44C755}" type="datetimeFigureOut">
               <a:rPr lang="en-US" smtClean="0"/>
-              <a:t>9/6/16</a:t>
+              <a:t>9/20/16</a:t>
             </a:fld>
             <a:endParaRPr lang="en-US"/>
           </a:p>
@@ -1977,7 +1977,7 @@
           <a:p>
             <a:fld id="{8314A642-4F67-384F-8484-C8FD7A44C755}" type="datetimeFigureOut">
               <a:rPr lang="en-US" smtClean="0"/>
-              <a:t>9/6/16</a:t>
+              <a:t>9/20/16</a:t>
             </a:fld>
             <a:endParaRPr lang="en-US"/>
           </a:p>
@@ -2254,7 +2254,7 @@
           <a:p>
             <a:fld id="{8314A642-4F67-384F-8484-C8FD7A44C755}" type="datetimeFigureOut">
               <a:rPr lang="en-US" smtClean="0"/>
-              <a:t>9/6/16</a:t>
+              <a:t>9/20/16</a:t>
             </a:fld>
             <a:endParaRPr lang="en-US"/>
           </a:p>
@@ -2507,7 +2507,7 @@
           <a:p>
             <a:fld id="{8314A642-4F67-384F-8484-C8FD7A44C755}" type="datetimeFigureOut">
               <a:rPr lang="en-US" smtClean="0"/>
-              <a:t>9/6/16</a:t>
+              <a:t>9/20/16</a:t>
             </a:fld>
             <a:endParaRPr lang="en-US"/>
           </a:p>
@@ -2720,7 +2720,7 @@
           <a:p>
             <a:fld id="{8314A642-4F67-384F-8484-C8FD7A44C755}" type="datetimeFigureOut">
               <a:rPr lang="en-US" smtClean="0"/>
-              <a:t>9/6/16</a:t>
+              <a:t>9/20/16</a:t>
             </a:fld>
             <a:endParaRPr lang="en-US"/>
           </a:p>
@@ -3134,7 +3134,7 @@
           <p:nvPr>
             <p:extLst>
               <p:ext uri="{D42A27DB-BD31-4B8C-83A1-F6EECF244321}">
-                <p14:modId xmlns:p14="http://schemas.microsoft.com/office/powerpoint/2010/main" val="2308129283"/>
+                <p14:modId xmlns:p14="http://schemas.microsoft.com/office/powerpoint/2010/main" val="2711768542"/>
               </p:ext>
             </p:extLst>
           </p:nvPr>
@@ -3200,7 +3200,7 @@
                             <a:srgbClr val="002060"/>
                           </a:solidFill>
                         </a:rPr>
-                        <a:t>L</a:t>
+                        <a:t>FP</a:t>
                       </a:r>
                       <a:r>
                         <a:rPr lang="en-US" b="1" baseline="-25000" dirty="0" smtClean="0">
@@ -3235,7 +3235,7 @@
                             <a:srgbClr val="002060"/>
                           </a:solidFill>
                         </a:rPr>
-                        <a:t>L</a:t>
+                        <a:t>FP</a:t>
                       </a:r>
                       <a:r>
                         <a:rPr lang="en-US" b="1" baseline="-25000" dirty="0" smtClean="0">

</xml_diff>